<commit_message>
add 1 ppt ~3 chatper
</commit_message>
<xml_diff>
--- a/1 - 소리.pptx
+++ b/1 - 소리.pptx
@@ -27,23 +27,31 @@
     <p:sldId id="294" r:id="rId21"/>
     <p:sldId id="295" r:id="rId22"/>
     <p:sldId id="296" r:id="rId23"/>
-    <p:sldId id="277" r:id="rId24"/>
+    <p:sldId id="297" r:id="rId24"/>
+    <p:sldId id="277" r:id="rId25"/>
   </p:sldIdLst>
   <p:sldSz cx="12192000" cy="6858000"/>
   <p:notesSz cx="6858000" cy="9144000"/>
   <p:embeddedFontLst>
     <p:embeddedFont>
+      <p:font typeface="Consolas" panose="020B0609020204030204" pitchFamily="49" charset="0"/>
+      <p:regular r:id="rId26"/>
+      <p:bold r:id="rId27"/>
+      <p:italic r:id="rId28"/>
+      <p:boldItalic r:id="rId29"/>
+    </p:embeddedFont>
+    <p:embeddedFont>
       <p:font typeface="나눔고딕OTF Light" panose="020D0904000000000000" pitchFamily="34" charset="-127"/>
-      <p:regular r:id="rId25"/>
+      <p:regular r:id="rId30"/>
     </p:embeddedFont>
     <p:embeddedFont>
       <p:font typeface="나눔스퀘어OTF Light" panose="020B0600000101010101" pitchFamily="34" charset="-127"/>
-      <p:regular r:id="rId26"/>
+      <p:regular r:id="rId31"/>
     </p:embeddedFont>
     <p:embeddedFont>
       <p:font typeface="맑은 고딕" panose="020B0503020000020004" pitchFamily="50" charset="-127"/>
-      <p:regular r:id="rId27"/>
-      <p:bold r:id="rId28"/>
+      <p:regular r:id="rId32"/>
+      <p:bold r:id="rId33"/>
     </p:embeddedFont>
   </p:embeddedFontLst>
   <p:defaultTextStyle>
@@ -6996,8 +7004,8 @@
         </p:nvSpPr>
         <p:spPr>
           <a:xfrm>
-            <a:off x="2822507" y="4743539"/>
-            <a:ext cx="6546985" cy="707886"/>
+            <a:off x="3470922" y="4743539"/>
+            <a:ext cx="5250155" cy="707886"/>
           </a:xfrm>
           <a:prstGeom prst="rect">
             <a:avLst/>
@@ -7031,21 +7039,7 @@
                 <a:latin typeface="나눔스퀘어OTF Light" panose="020B0600000101010101" pitchFamily="34" charset="-127"/>
                 <a:ea typeface="나눔스퀘어OTF Light" panose="020B0600000101010101" pitchFamily="34" charset="-127"/>
               </a:rPr>
-              <a:t>스냅샷을 </a:t>
-            </a:r>
-            <a:r>
-              <a:rPr lang="en-US" altLang="ko-KR" sz="2000">
-                <a:latin typeface="나눔스퀘어OTF Light" panose="020B0600000101010101" pitchFamily="34" charset="-127"/>
-                <a:ea typeface="나눔스퀘어OTF Light" panose="020B0600000101010101" pitchFamily="34" charset="-127"/>
-              </a:rPr>
-              <a:t>Snapshot2</a:t>
-            </a:r>
-            <a:r>
-              <a:rPr lang="ko-KR" altLang="en-US" sz="2000">
-                <a:latin typeface="나눔스퀘어OTF Light" panose="020B0600000101010101" pitchFamily="34" charset="-127"/>
-                <a:ea typeface="나눔스퀘어OTF Light" panose="020B0600000101010101" pitchFamily="34" charset="-127"/>
-              </a:rPr>
-              <a:t>로 바꾸면 마스터 볼륨의 음량이 증가됨</a:t>
+              <a:t>스냅샷을 믹서에 적용하면 스냅샷의 값으로 바뀜</a:t>
             </a:r>
             <a:endParaRPr lang="en-US" altLang="ko-KR" sz="2000">
               <a:latin typeface="나눔스퀘어OTF Light" panose="020B0600000101010101" pitchFamily="34" charset="-127"/>
@@ -7972,7 +7966,7 @@
         </p:blipFill>
         <p:spPr>
           <a:xfrm>
-            <a:off x="3931214" y="1455041"/>
+            <a:off x="3931214" y="1280474"/>
             <a:ext cx="4329572" cy="929134"/>
           </a:xfrm>
           <a:prstGeom prst="rect">
@@ -7994,7 +7988,7 @@
         </p:nvSpPr>
         <p:spPr>
           <a:xfrm>
-            <a:off x="1821432" y="2597875"/>
+            <a:off x="1821432" y="2423308"/>
             <a:ext cx="8549135" cy="400110"/>
           </a:xfrm>
           <a:prstGeom prst="rect">
@@ -8015,6 +8009,342 @@
                 <a:ea typeface="나눔스퀘어OTF Light" panose="020B0600000101010101" pitchFamily="34" charset="-127"/>
               </a:rPr>
               <a:t>오디오 소스의 아웃풋을 특정한 그룹으로 지정하여 오디오 믹서를 사용할 수 있음</a:t>
+            </a:r>
+            <a:endParaRPr lang="en-US" altLang="ko-KR" sz="2000">
+              <a:latin typeface="나눔스퀘어OTF Light" panose="020B0600000101010101" pitchFamily="34" charset="-127"/>
+              <a:ea typeface="나눔스퀘어OTF Light" panose="020B0600000101010101" pitchFamily="34" charset="-127"/>
+            </a:endParaRPr>
+          </a:p>
+        </p:txBody>
+      </p:sp>
+      <p:sp>
+        <p:nvSpPr>
+          <p:cNvPr id="9" name="TextBox 8">
+            <a:extLst>
+              <a:ext uri="{FF2B5EF4-FFF2-40B4-BE49-F238E27FC236}">
+                <a16:creationId xmlns:a16="http://schemas.microsoft.com/office/drawing/2014/main" id="{2B8AC1FB-2140-4055-97F7-B9010415AA6A}"/>
+              </a:ext>
+            </a:extLst>
+          </p:cNvPr>
+          <p:cNvSpPr txBox="1"/>
+          <p:nvPr/>
+        </p:nvSpPr>
+        <p:spPr>
+          <a:xfrm>
+            <a:off x="3047307" y="3534310"/>
+            <a:ext cx="6097384" cy="2031325"/>
+          </a:xfrm>
+          <a:prstGeom prst="rect">
+            <a:avLst/>
+          </a:prstGeom>
+          <a:solidFill>
+            <a:schemeClr val="tx1"/>
+          </a:solidFill>
+        </p:spPr>
+        <p:txBody>
+          <a:bodyPr wrap="square">
+            <a:spAutoFit/>
+          </a:bodyPr>
+          <a:lstStyle/>
+          <a:p>
+            <a:r>
+              <a:rPr lang="en-US" altLang="ko-KR" b="0">
+                <a:solidFill>
+                  <a:srgbClr val="D4D4D4"/>
+                </a:solidFill>
+                <a:effectLst/>
+                <a:latin typeface="Consolas" panose="020B0609020204030204" pitchFamily="49" charset="0"/>
+              </a:rPr>
+              <a:t>[</a:t>
+            </a:r>
+            <a:r>
+              <a:rPr lang="en-US" altLang="ko-KR" b="0">
+                <a:solidFill>
+                  <a:srgbClr val="4EC9B0"/>
+                </a:solidFill>
+                <a:effectLst/>
+                <a:latin typeface="Consolas" panose="020B0609020204030204" pitchFamily="49" charset="0"/>
+              </a:rPr>
+              <a:t>SerializeField</a:t>
+            </a:r>
+            <a:r>
+              <a:rPr lang="en-US" altLang="ko-KR" b="0">
+                <a:solidFill>
+                  <a:srgbClr val="D4D4D4"/>
+                </a:solidFill>
+                <a:effectLst/>
+                <a:latin typeface="Consolas" panose="020B0609020204030204" pitchFamily="49" charset="0"/>
+              </a:rPr>
+              <a:t>]</a:t>
+            </a:r>
+          </a:p>
+          <a:p>
+            <a:r>
+              <a:rPr lang="en-US" altLang="ko-KR" b="0">
+                <a:solidFill>
+                  <a:srgbClr val="4EC9B0"/>
+                </a:solidFill>
+                <a:effectLst/>
+                <a:latin typeface="Consolas" panose="020B0609020204030204" pitchFamily="49" charset="0"/>
+              </a:rPr>
+              <a:t>AudioMixer</a:t>
+            </a:r>
+            <a:r>
+              <a:rPr lang="en-US" altLang="ko-KR" b="0">
+                <a:solidFill>
+                  <a:srgbClr val="D4D4D4"/>
+                </a:solidFill>
+                <a:effectLst/>
+                <a:latin typeface="Consolas" panose="020B0609020204030204" pitchFamily="49" charset="0"/>
+              </a:rPr>
+              <a:t> </a:t>
+            </a:r>
+            <a:r>
+              <a:rPr lang="en-US" altLang="ko-KR" b="0">
+                <a:solidFill>
+                  <a:srgbClr val="9CDCFE"/>
+                </a:solidFill>
+                <a:effectLst/>
+                <a:latin typeface="Consolas" panose="020B0609020204030204" pitchFamily="49" charset="0"/>
+              </a:rPr>
+              <a:t>mixer</a:t>
+            </a:r>
+            <a:r>
+              <a:rPr lang="en-US" altLang="ko-KR" b="0">
+                <a:solidFill>
+                  <a:srgbClr val="D4D4D4"/>
+                </a:solidFill>
+                <a:effectLst/>
+                <a:latin typeface="Consolas" panose="020B0609020204030204" pitchFamily="49" charset="0"/>
+              </a:rPr>
+              <a:t>;</a:t>
+            </a:r>
+          </a:p>
+          <a:p>
+            <a:br>
+              <a:rPr lang="en-US" altLang="ko-KR" b="0">
+                <a:solidFill>
+                  <a:srgbClr val="D4D4D4"/>
+                </a:solidFill>
+                <a:effectLst/>
+                <a:latin typeface="Consolas" panose="020B0609020204030204" pitchFamily="49" charset="0"/>
+              </a:rPr>
+            </a:br>
+            <a:r>
+              <a:rPr lang="en-US" altLang="ko-KR" b="0">
+                <a:solidFill>
+                  <a:srgbClr val="569CD6"/>
+                </a:solidFill>
+                <a:effectLst/>
+                <a:latin typeface="Consolas" panose="020B0609020204030204" pitchFamily="49" charset="0"/>
+              </a:rPr>
+              <a:t>void</a:t>
+            </a:r>
+            <a:r>
+              <a:rPr lang="en-US" altLang="ko-KR" b="0">
+                <a:solidFill>
+                  <a:srgbClr val="D4D4D4"/>
+                </a:solidFill>
+                <a:effectLst/>
+                <a:latin typeface="Consolas" panose="020B0609020204030204" pitchFamily="49" charset="0"/>
+              </a:rPr>
+              <a:t> </a:t>
+            </a:r>
+            <a:r>
+              <a:rPr lang="en-US" altLang="ko-KR" b="0">
+                <a:solidFill>
+                  <a:srgbClr val="DCDCAA"/>
+                </a:solidFill>
+                <a:effectLst/>
+                <a:latin typeface="Consolas" panose="020B0609020204030204" pitchFamily="49" charset="0"/>
+              </a:rPr>
+              <a:t>Start</a:t>
+            </a:r>
+            <a:r>
+              <a:rPr lang="en-US" altLang="ko-KR" b="0">
+                <a:solidFill>
+                  <a:srgbClr val="D4D4D4"/>
+                </a:solidFill>
+                <a:effectLst/>
+                <a:latin typeface="Consolas" panose="020B0609020204030204" pitchFamily="49" charset="0"/>
+              </a:rPr>
+              <a:t>()</a:t>
+            </a:r>
+          </a:p>
+          <a:p>
+            <a:r>
+              <a:rPr lang="en-US" altLang="ko-KR" b="0">
+                <a:solidFill>
+                  <a:srgbClr val="D4D4D4"/>
+                </a:solidFill>
+                <a:effectLst/>
+                <a:latin typeface="Consolas" panose="020B0609020204030204" pitchFamily="49" charset="0"/>
+              </a:rPr>
+              <a:t>{</a:t>
+            </a:r>
+          </a:p>
+          <a:p>
+            <a:r>
+              <a:rPr lang="en-US" altLang="ko-KR" b="0">
+                <a:solidFill>
+                  <a:srgbClr val="D4D4D4"/>
+                </a:solidFill>
+                <a:effectLst/>
+                <a:latin typeface="Consolas" panose="020B0609020204030204" pitchFamily="49" charset="0"/>
+              </a:rPr>
+              <a:t>    </a:t>
+            </a:r>
+            <a:r>
+              <a:rPr lang="en-US" altLang="ko-KR" b="0">
+                <a:solidFill>
+                  <a:srgbClr val="9CDCFE"/>
+                </a:solidFill>
+                <a:effectLst/>
+                <a:latin typeface="Consolas" panose="020B0609020204030204" pitchFamily="49" charset="0"/>
+              </a:rPr>
+              <a:t>mixer</a:t>
+            </a:r>
+            <a:r>
+              <a:rPr lang="en-US" altLang="ko-KR" b="0">
+                <a:solidFill>
+                  <a:srgbClr val="D4D4D4"/>
+                </a:solidFill>
+                <a:effectLst/>
+                <a:latin typeface="Consolas" panose="020B0609020204030204" pitchFamily="49" charset="0"/>
+              </a:rPr>
+              <a:t>.</a:t>
+            </a:r>
+            <a:r>
+              <a:rPr lang="en-US" altLang="ko-KR" b="0">
+                <a:solidFill>
+                  <a:srgbClr val="DCDCAA"/>
+                </a:solidFill>
+                <a:effectLst/>
+                <a:latin typeface="Consolas" panose="020B0609020204030204" pitchFamily="49" charset="0"/>
+              </a:rPr>
+              <a:t>SetFloat</a:t>
+            </a:r>
+            <a:r>
+              <a:rPr lang="en-US" altLang="ko-KR" b="0">
+                <a:solidFill>
+                  <a:srgbClr val="D4D4D4"/>
+                </a:solidFill>
+                <a:effectLst/>
+                <a:latin typeface="Consolas" panose="020B0609020204030204" pitchFamily="49" charset="0"/>
+              </a:rPr>
+              <a:t>(</a:t>
+            </a:r>
+            <a:r>
+              <a:rPr lang="en-US" altLang="ko-KR" b="0">
+                <a:solidFill>
+                  <a:srgbClr val="CE9178"/>
+                </a:solidFill>
+                <a:effectLst/>
+                <a:latin typeface="Consolas" panose="020B0609020204030204" pitchFamily="49" charset="0"/>
+              </a:rPr>
+              <a:t>"playerVol"</a:t>
+            </a:r>
+            <a:r>
+              <a:rPr lang="en-US" altLang="ko-KR" b="0">
+                <a:solidFill>
+                  <a:srgbClr val="D4D4D4"/>
+                </a:solidFill>
+                <a:effectLst/>
+                <a:latin typeface="Consolas" panose="020B0609020204030204" pitchFamily="49" charset="0"/>
+              </a:rPr>
+              <a:t>, -</a:t>
+            </a:r>
+            <a:r>
+              <a:rPr lang="en-US" altLang="ko-KR" b="0">
+                <a:solidFill>
+                  <a:srgbClr val="B5CEA8"/>
+                </a:solidFill>
+                <a:effectLst/>
+                <a:latin typeface="Consolas" panose="020B0609020204030204" pitchFamily="49" charset="0"/>
+              </a:rPr>
+              <a:t>80.0f</a:t>
+            </a:r>
+            <a:r>
+              <a:rPr lang="en-US" altLang="ko-KR" b="0">
+                <a:solidFill>
+                  <a:srgbClr val="D4D4D4"/>
+                </a:solidFill>
+                <a:effectLst/>
+                <a:latin typeface="Consolas" panose="020B0609020204030204" pitchFamily="49" charset="0"/>
+              </a:rPr>
+              <a:t>);</a:t>
+            </a:r>
+          </a:p>
+          <a:p>
+            <a:r>
+              <a:rPr lang="en-US" altLang="ko-KR" b="0">
+                <a:solidFill>
+                  <a:srgbClr val="D4D4D4"/>
+                </a:solidFill>
+                <a:effectLst/>
+                <a:latin typeface="Consolas" panose="020B0609020204030204" pitchFamily="49" charset="0"/>
+              </a:rPr>
+              <a:t>}</a:t>
+            </a:r>
+          </a:p>
+        </p:txBody>
+      </p:sp>
+      <p:sp>
+        <p:nvSpPr>
+          <p:cNvPr id="11" name="TextBox 10">
+            <a:extLst>
+              <a:ext uri="{FF2B5EF4-FFF2-40B4-BE49-F238E27FC236}">
+                <a16:creationId xmlns:a16="http://schemas.microsoft.com/office/drawing/2014/main" id="{45268CE6-D43E-4259-BD9D-D63A76A0A652}"/>
+              </a:ext>
+            </a:extLst>
+          </p:cNvPr>
+          <p:cNvSpPr txBox="1"/>
+          <p:nvPr/>
+        </p:nvSpPr>
+        <p:spPr>
+          <a:xfrm>
+            <a:off x="2695054" y="5692806"/>
+            <a:ext cx="7206461" cy="400110"/>
+          </a:xfrm>
+          <a:prstGeom prst="rect">
+            <a:avLst/>
+          </a:prstGeom>
+          <a:noFill/>
+        </p:spPr>
+        <p:txBody>
+          <a:bodyPr wrap="none" rtlCol="0">
+            <a:spAutoFit/>
+          </a:bodyPr>
+          <a:lstStyle/>
+          <a:p>
+            <a:pPr algn="ctr"/>
+            <a:r>
+              <a:rPr lang="en-US" altLang="ko-KR" sz="2000">
+                <a:latin typeface="나눔스퀘어OTF Light" panose="020B0600000101010101" pitchFamily="34" charset="-127"/>
+                <a:ea typeface="나눔스퀘어OTF Light" panose="020B0600000101010101" pitchFamily="34" charset="-127"/>
+              </a:rPr>
+              <a:t>Exposed Parameter </a:t>
+            </a:r>
+            <a:r>
+              <a:rPr lang="ko-KR" altLang="en-US" sz="2000">
+                <a:latin typeface="나눔스퀘어OTF Light" panose="020B0600000101010101" pitchFamily="34" charset="-127"/>
+                <a:ea typeface="나눔스퀘어OTF Light" panose="020B0600000101010101" pitchFamily="34" charset="-127"/>
+              </a:rPr>
+              <a:t>설정 이후 </a:t>
+            </a:r>
+            <a:r>
+              <a:rPr lang="en-US" altLang="ko-KR" sz="2000">
+                <a:latin typeface="나눔스퀘어OTF Light" panose="020B0600000101010101" pitchFamily="34" charset="-127"/>
+                <a:ea typeface="나눔스퀘어OTF Light" panose="020B0600000101010101" pitchFamily="34" charset="-127"/>
+              </a:rPr>
+              <a:t>C# </a:t>
+            </a:r>
+            <a:r>
+              <a:rPr lang="ko-KR" altLang="en-US" sz="2000">
+                <a:latin typeface="나눔스퀘어OTF Light" panose="020B0600000101010101" pitchFamily="34" charset="-127"/>
+                <a:ea typeface="나눔스퀘어OTF Light" panose="020B0600000101010101" pitchFamily="34" charset="-127"/>
+              </a:rPr>
+              <a:t>코드로 믹서의 값 변경하는 코드</a:t>
             </a:r>
             <a:endParaRPr lang="en-US" altLang="ko-KR" sz="2000">
               <a:latin typeface="나눔스퀘어OTF Light" panose="020B0600000101010101" pitchFamily="34" charset="-127"/>
@@ -8037,6 +8367,124 @@
 </file>
 
 <file path=ppt/slides/slide23.xml><?xml version="1.0" encoding="utf-8"?>
+<p:sld xmlns:a="http://schemas.openxmlformats.org/drawingml/2006/main" xmlns:r="http://schemas.openxmlformats.org/officeDocument/2006/relationships" xmlns:p="http://schemas.openxmlformats.org/presentationml/2006/main">
+  <p:cSld>
+    <p:spTree>
+      <p:nvGrpSpPr>
+        <p:cNvPr id="1" name=""/>
+        <p:cNvGrpSpPr/>
+        <p:nvPr/>
+      </p:nvGrpSpPr>
+      <p:grpSpPr>
+        <a:xfrm>
+          <a:off x="0" y="0"/>
+          <a:ext cx="0" cy="0"/>
+          <a:chOff x="0" y="0"/>
+          <a:chExt cx="0" cy="0"/>
+        </a:xfrm>
+      </p:grpSpPr>
+      <p:sp>
+        <p:nvSpPr>
+          <p:cNvPr id="6" name="TextBox 5">
+            <a:extLst>
+              <a:ext uri="{FF2B5EF4-FFF2-40B4-BE49-F238E27FC236}">
+                <a16:creationId xmlns:a16="http://schemas.microsoft.com/office/drawing/2014/main" id="{F453C929-8CA3-4E79-AF5D-99EC8407C6CF}"/>
+              </a:ext>
+            </a:extLst>
+          </p:cNvPr>
+          <p:cNvSpPr txBox="1"/>
+          <p:nvPr/>
+        </p:nvSpPr>
+        <p:spPr>
+          <a:xfrm>
+            <a:off x="171888" y="194702"/>
+            <a:ext cx="2698175" cy="523220"/>
+          </a:xfrm>
+          <a:prstGeom prst="rect">
+            <a:avLst/>
+          </a:prstGeom>
+          <a:noFill/>
+        </p:spPr>
+        <p:txBody>
+          <a:bodyPr wrap="none" rtlCol="0">
+            <a:spAutoFit/>
+          </a:bodyPr>
+          <a:lstStyle/>
+          <a:p>
+            <a:r>
+              <a:rPr lang="en-US" altLang="ko-KR" sz="2800">
+                <a:latin typeface="나눔스퀘어OTF Light" panose="020B0600000101010101" pitchFamily="34" charset="-127"/>
+                <a:ea typeface="나눔스퀘어OTF Light" panose="020B0600000101010101" pitchFamily="34" charset="-127"/>
+              </a:rPr>
+              <a:t>4. </a:t>
+            </a:r>
+            <a:r>
+              <a:rPr lang="ko-KR" altLang="en-US" sz="2800">
+                <a:latin typeface="나눔스퀘어OTF Light" panose="020B0600000101010101" pitchFamily="34" charset="-127"/>
+                <a:ea typeface="나눔스퀘어OTF Light" panose="020B0600000101010101" pitchFamily="34" charset="-127"/>
+              </a:rPr>
+              <a:t>사운드 매니저</a:t>
+            </a:r>
+          </a:p>
+        </p:txBody>
+      </p:sp>
+      <p:cxnSp>
+        <p:nvCxnSpPr>
+          <p:cNvPr id="4" name="직선 연결선 3">
+            <a:extLst>
+              <a:ext uri="{FF2B5EF4-FFF2-40B4-BE49-F238E27FC236}">
+                <a16:creationId xmlns:a16="http://schemas.microsoft.com/office/drawing/2014/main" id="{7442459B-3DED-44F0-9E4C-B50601FEB425}"/>
+              </a:ext>
+            </a:extLst>
+          </p:cNvPr>
+          <p:cNvCxnSpPr>
+            <a:cxnSpLocks/>
+          </p:cNvCxnSpPr>
+          <p:nvPr/>
+        </p:nvCxnSpPr>
+        <p:spPr>
+          <a:xfrm>
+            <a:off x="132133" y="780690"/>
+            <a:ext cx="819295" cy="0"/>
+          </a:xfrm>
+          <a:prstGeom prst="line">
+            <a:avLst/>
+          </a:prstGeom>
+          <a:ln>
+            <a:solidFill>
+              <a:schemeClr val="tx1"/>
+            </a:solidFill>
+          </a:ln>
+        </p:spPr>
+        <p:style>
+          <a:lnRef idx="1">
+            <a:schemeClr val="accent1"/>
+          </a:lnRef>
+          <a:fillRef idx="0">
+            <a:schemeClr val="accent1"/>
+          </a:fillRef>
+          <a:effectRef idx="0">
+            <a:schemeClr val="accent1"/>
+          </a:effectRef>
+          <a:fontRef idx="minor">
+            <a:schemeClr val="tx1"/>
+          </a:fontRef>
+        </p:style>
+      </p:cxnSp>
+    </p:spTree>
+    <p:extLst>
+      <p:ext uri="{BB962C8B-B14F-4D97-AF65-F5344CB8AC3E}">
+        <p14:creationId xmlns:p14="http://schemas.microsoft.com/office/powerpoint/2010/main" val="3742434320"/>
+      </p:ext>
+    </p:extLst>
+  </p:cSld>
+  <p:clrMapOvr>
+    <a:masterClrMapping/>
+  </p:clrMapOvr>
+</p:sld>
+</file>
+
+<file path=ppt/slides/slide24.xml><?xml version="1.0" encoding="utf-8"?>
 <p:sld xmlns:a="http://schemas.openxmlformats.org/drawingml/2006/main" xmlns:r="http://schemas.openxmlformats.org/officeDocument/2006/relationships" xmlns:p="http://schemas.openxmlformats.org/presentationml/2006/main">
   <p:cSld>
     <p:spTree>

</xml_diff>